<commit_message>
Update - add msoa maps
</commit_message>
<xml_diff>
--- a/Death Slides - West Sussex V1 12 May.pptx
+++ b/Death Slides - West Sussex V1 12 May.pptx
@@ -10,9 +10,11 @@
     <p:sldId id="265" r:id="rId7"/>
     <p:sldId id="266" r:id="rId8"/>
     <p:sldId id="267" r:id="rId9"/>
-    <p:sldId id="269" r:id="rId10"/>
-    <p:sldId id="268" r:id="rId11"/>
-    <p:sldId id="270" r:id="rId12"/>
+    <p:sldId id="268" r:id="rId10"/>
+    <p:sldId id="269" r:id="rId11"/>
+    <p:sldId id="271" r:id="rId12"/>
+    <p:sldId id="272" r:id="rId13"/>
+    <p:sldId id="270" r:id="rId14"/>
   </p:sldIdLst>
   <p:sldSz cx="12192000" cy="6858000"/>
   <p:notesSz cx="6858000" cy="9144000"/>
@@ -3492,7 +3494,11 @@
             </a:pPr>
             <a:r>
               <a:rPr lang="en-GB" sz="1400" dirty="0"/>
-              <a:t>Two sets of tables are presented, one set based on the date of registration and one set based on date of occurrence of death. Two sets have been provided as there can be a time lag between a death taking place and the subsequent registration. The tables include deaths that occurred up to 17 April but were registered up to 25 April. </a:t>
+              <a:t>Two sets of tables are presented, one set based on the date of registration and one set based on date of occurrence of death. Two sets have been provided as there can be a time lag between a death taking place and the subsequent registration. The tables include deaths that occurred up to 1 May but were registered </a:t>
+            </a:r>
+            <a:r>
+              <a:rPr lang="en-GB" sz="1400"/>
+              <a:t>up to 9 May. </a:t>
             </a:r>
             <a:r>
               <a:rPr lang="en-GB" sz="1400" dirty="0">
@@ -3571,7 +3577,7 @@
                   <a:schemeClr val="accent1"/>
                 </a:solidFill>
               </a:rPr>
-              <a:t>Cumulative data on deaths occurring between 01/03/2020 and 24/04/2020 are available by sex at local level and these will be published as soon as possible.</a:t>
+              <a:t>Cumulative data on deaths occurring between 01/03/2020 and 17/04/2020 are available by sex at local level and these will be published as soon as possible.</a:t>
             </a:r>
           </a:p>
           <a:p>
@@ -3618,6 +3624,89 @@
     <p:extLst>
       <p:ext uri="{BB962C8B-B14F-4D97-AF65-F5344CB8AC3E}">
         <p14:creationId xmlns:p14="http://schemas.microsoft.com/office/powerpoint/2010/main" val="4225585468"/>
+      </p:ext>
+    </p:extLst>
+  </p:cSld>
+  <p:clrMapOvr>
+    <a:masterClrMapping/>
+  </p:clrMapOvr>
+</p:sld>
+</file>
+
+<file path=ppt/slides/slide10.xml><?xml version="1.0" encoding="utf-8"?>
+<p:sld xmlns:a="http://schemas.openxmlformats.org/drawingml/2006/main" xmlns:r="http://schemas.openxmlformats.org/officeDocument/2006/relationships" xmlns:p="http://schemas.openxmlformats.org/presentationml/2006/main">
+  <p:cSld>
+    <p:spTree>
+      <p:nvGrpSpPr>
+        <p:cNvPr id="1" name=""/>
+        <p:cNvGrpSpPr/>
+        <p:nvPr/>
+      </p:nvGrpSpPr>
+      <p:grpSpPr>
+        <a:xfrm>
+          <a:off x="0" y="0"/>
+          <a:ext cx="0" cy="0"/>
+          <a:chOff x="0" y="0"/>
+          <a:chExt cx="0" cy="0"/>
+        </a:xfrm>
+      </p:grpSpPr>
+      <p:sp>
+        <p:nvSpPr>
+          <p:cNvPr id="2" name="Title 1">
+            <a:extLst>
+              <a:ext uri="{FF2B5EF4-FFF2-40B4-BE49-F238E27FC236}">
+                <a16:creationId xmlns:a16="http://schemas.microsoft.com/office/drawing/2014/main" id="{F927E3CD-0C2E-2B4A-B79F-6CE4DD69EB8C}"/>
+              </a:ext>
+            </a:extLst>
+          </p:cNvPr>
+          <p:cNvSpPr>
+            <a:spLocks noGrp="1"/>
+          </p:cNvSpPr>
+          <p:nvPr>
+            <p:ph type="title"/>
+          </p:nvPr>
+        </p:nvSpPr>
+        <p:spPr/>
+        <p:txBody>
+          <a:bodyPr/>
+          <a:lstStyle/>
+          <a:p>
+            <a:r>
+              <a:rPr lang="en-US" dirty="0"/>
+              <a:t>Care homes</a:t>
+            </a:r>
+          </a:p>
+        </p:txBody>
+      </p:sp>
+      <p:sp>
+        <p:nvSpPr>
+          <p:cNvPr id="3" name="Content Placeholder 2">
+            <a:extLst>
+              <a:ext uri="{FF2B5EF4-FFF2-40B4-BE49-F238E27FC236}">
+                <a16:creationId xmlns:a16="http://schemas.microsoft.com/office/drawing/2014/main" id="{3D1C0A0D-DBB2-3948-8796-01DA98B5DFFE}"/>
+              </a:ext>
+            </a:extLst>
+          </p:cNvPr>
+          <p:cNvSpPr>
+            <a:spLocks noGrp="1"/>
+          </p:cNvSpPr>
+          <p:nvPr>
+            <p:ph idx="1"/>
+          </p:nvPr>
+        </p:nvSpPr>
+        <p:spPr/>
+        <p:txBody>
+          <a:bodyPr/>
+          <a:lstStyle/>
+          <a:p>
+            <a:endParaRPr lang="en-US"/>
+          </a:p>
+        </p:txBody>
+      </p:sp>
+    </p:spTree>
+    <p:extLst>
+      <p:ext uri="{BB962C8B-B14F-4D97-AF65-F5344CB8AC3E}">
+        <p14:creationId xmlns:p14="http://schemas.microsoft.com/office/powerpoint/2010/main" val="4200131781"/>
       </p:ext>
     </p:extLst>
   </p:cSld>
@@ -23519,6 +23608,106 @@
           <p:cNvPr id="5" name="Content Placeholder 4">
             <a:extLst>
               <a:ext uri="{FF2B5EF4-FFF2-40B4-BE49-F238E27FC236}">
+                <a16:creationId xmlns:a16="http://schemas.microsoft.com/office/drawing/2014/main" id="{A40F5990-07D7-614F-B3C6-954900348894}"/>
+              </a:ext>
+            </a:extLst>
+          </p:cNvPr>
+          <p:cNvPicPr>
+            <a:picLocks noGrp="1" noChangeAspect="1"/>
+          </p:cNvPicPr>
+          <p:nvPr>
+            <p:ph idx="1"/>
+          </p:nvPr>
+        </p:nvPicPr>
+        <p:blipFill>
+          <a:blip r:embed="rId2">
+            <a:extLst>
+              <a:ext uri="{28A0092B-C50C-407E-A947-70E740481C1C}">
+                <a14:useLocalDpi xmlns:a14="http://schemas.microsoft.com/office/drawing/2010/main" val="0"/>
+              </a:ext>
+            </a:extLst>
+          </a:blip>
+          <a:stretch>
+            <a:fillRect/>
+          </a:stretch>
+        </p:blipFill>
+        <p:spPr>
+          <a:xfrm>
+            <a:off x="235865" y="295835"/>
+            <a:ext cx="11236176" cy="6266329"/>
+          </a:xfrm>
+        </p:spPr>
+      </p:pic>
+      <p:sp>
+        <p:nvSpPr>
+          <p:cNvPr id="6" name="TextBox 5">
+            <a:extLst>
+              <a:ext uri="{FF2B5EF4-FFF2-40B4-BE49-F238E27FC236}">
+                <a16:creationId xmlns:a16="http://schemas.microsoft.com/office/drawing/2014/main" id="{74EC441D-1E27-F849-AA9E-59E20F72E2BD}"/>
+              </a:ext>
+            </a:extLst>
+          </p:cNvPr>
+          <p:cNvSpPr txBox="1"/>
+          <p:nvPr/>
+        </p:nvSpPr>
+        <p:spPr>
+          <a:xfrm>
+            <a:off x="192062" y="103363"/>
+            <a:ext cx="4811638" cy="338554"/>
+          </a:xfrm>
+          <a:prstGeom prst="rect">
+            <a:avLst/>
+          </a:prstGeom>
+          <a:noFill/>
+        </p:spPr>
+        <p:txBody>
+          <a:bodyPr wrap="none" rtlCol="0">
+            <a:spAutoFit/>
+          </a:bodyPr>
+          <a:lstStyle/>
+          <a:p>
+            <a:r>
+              <a:rPr lang="en-US" sz="1600" dirty="0"/>
+              <a:t>All cause mortality; occurring 01/03/2020 – 17/04/2020</a:t>
+            </a:r>
+          </a:p>
+        </p:txBody>
+      </p:sp>
+    </p:spTree>
+    <p:extLst>
+      <p:ext uri="{BB962C8B-B14F-4D97-AF65-F5344CB8AC3E}">
+        <p14:creationId xmlns:p14="http://schemas.microsoft.com/office/powerpoint/2010/main" val="2107338438"/>
+      </p:ext>
+    </p:extLst>
+  </p:cSld>
+  <p:clrMapOvr>
+    <a:masterClrMapping/>
+  </p:clrMapOvr>
+</p:sld>
+</file>
+
+<file path=ppt/slides/slide7.xml><?xml version="1.0" encoding="utf-8"?>
+<p:sld xmlns:a="http://schemas.openxmlformats.org/drawingml/2006/main" xmlns:r="http://schemas.openxmlformats.org/officeDocument/2006/relationships" xmlns:p="http://schemas.openxmlformats.org/presentationml/2006/main">
+  <p:cSld>
+    <p:spTree>
+      <p:nvGrpSpPr>
+        <p:cNvPr id="1" name=""/>
+        <p:cNvGrpSpPr/>
+        <p:nvPr/>
+      </p:nvGrpSpPr>
+      <p:grpSpPr>
+        <a:xfrm>
+          <a:off x="0" y="0"/>
+          <a:ext cx="0" cy="0"/>
+          <a:chOff x="0" y="0"/>
+          <a:chExt cx="0" cy="0"/>
+        </a:xfrm>
+      </p:grpSpPr>
+      <p:pic>
+        <p:nvPicPr>
+          <p:cNvPr id="5" name="Content Placeholder 4">
+            <a:extLst>
+              <a:ext uri="{FF2B5EF4-FFF2-40B4-BE49-F238E27FC236}">
                 <a16:creationId xmlns:a16="http://schemas.microsoft.com/office/drawing/2014/main" id="{1DCC3F51-97F7-9F4B-BDE5-432DF1984869}"/>
               </a:ext>
             </a:extLst>
@@ -25010,86 +25199,6 @@
 </p:sld>
 </file>
 
-<file path=ppt/slides/slide7.xml><?xml version="1.0" encoding="utf-8"?>
-<p:sld xmlns:a="http://schemas.openxmlformats.org/drawingml/2006/main" xmlns:r="http://schemas.openxmlformats.org/officeDocument/2006/relationships" xmlns:p="http://schemas.openxmlformats.org/presentationml/2006/main">
-  <p:cSld>
-    <p:spTree>
-      <p:nvGrpSpPr>
-        <p:cNvPr id="1" name=""/>
-        <p:cNvGrpSpPr/>
-        <p:nvPr/>
-      </p:nvGrpSpPr>
-      <p:grpSpPr>
-        <a:xfrm>
-          <a:off x="0" y="0"/>
-          <a:ext cx="0" cy="0"/>
-          <a:chOff x="0" y="0"/>
-          <a:chExt cx="0" cy="0"/>
-        </a:xfrm>
-      </p:grpSpPr>
-      <p:sp>
-        <p:nvSpPr>
-          <p:cNvPr id="2" name="Title 1">
-            <a:extLst>
-              <a:ext uri="{FF2B5EF4-FFF2-40B4-BE49-F238E27FC236}">
-                <a16:creationId xmlns:a16="http://schemas.microsoft.com/office/drawing/2014/main" id="{47235925-E199-9D45-B88C-02AC33253F36}"/>
-              </a:ext>
-            </a:extLst>
-          </p:cNvPr>
-          <p:cNvSpPr>
-            <a:spLocks noGrp="1"/>
-          </p:cNvSpPr>
-          <p:nvPr>
-            <p:ph type="title"/>
-          </p:nvPr>
-        </p:nvSpPr>
-        <p:spPr/>
-        <p:txBody>
-          <a:bodyPr/>
-          <a:lstStyle/>
-          <a:p>
-            <a:endParaRPr lang="en-US"/>
-          </a:p>
-        </p:txBody>
-      </p:sp>
-      <p:sp>
-        <p:nvSpPr>
-          <p:cNvPr id="3" name="Content Placeholder 2">
-            <a:extLst>
-              <a:ext uri="{FF2B5EF4-FFF2-40B4-BE49-F238E27FC236}">
-                <a16:creationId xmlns:a16="http://schemas.microsoft.com/office/drawing/2014/main" id="{64215ADF-7F92-384C-9003-31D7717170E4}"/>
-              </a:ext>
-            </a:extLst>
-          </p:cNvPr>
-          <p:cNvSpPr>
-            <a:spLocks noGrp="1"/>
-          </p:cNvSpPr>
-          <p:nvPr>
-            <p:ph idx="1"/>
-          </p:nvPr>
-        </p:nvSpPr>
-        <p:spPr/>
-        <p:txBody>
-          <a:bodyPr/>
-          <a:lstStyle/>
-          <a:p>
-            <a:endParaRPr lang="en-US"/>
-          </a:p>
-        </p:txBody>
-      </p:sp>
-    </p:spTree>
-    <p:extLst>
-      <p:ext uri="{BB962C8B-B14F-4D97-AF65-F5344CB8AC3E}">
-        <p14:creationId xmlns:p14="http://schemas.microsoft.com/office/powerpoint/2010/main" val="2107338438"/>
-      </p:ext>
-    </p:extLst>
-  </p:cSld>
-  <p:clrMapOvr>
-    <a:masterClrMapping/>
-  </p:clrMapOvr>
-</p:sld>
-</file>
-
 <file path=ppt/slides/slide8.xml><?xml version="1.0" encoding="utf-8"?>
 <p:sld xmlns:a="http://schemas.openxmlformats.org/drawingml/2006/main" xmlns:r="http://schemas.openxmlformats.org/officeDocument/2006/relationships" xmlns:p="http://schemas.openxmlformats.org/presentationml/2006/main">
   <p:cSld>
@@ -25107,63 +25216,178 @@
           <a:chExt cx="0" cy="0"/>
         </a:xfrm>
       </p:grpSpPr>
-      <p:sp>
-        <p:nvSpPr>
-          <p:cNvPr id="2" name="Title 1">
+      <p:pic>
+        <p:nvPicPr>
+          <p:cNvPr id="5" name="Content Placeholder 4">
             <a:extLst>
               <a:ext uri="{FF2B5EF4-FFF2-40B4-BE49-F238E27FC236}">
-                <a16:creationId xmlns:a16="http://schemas.microsoft.com/office/drawing/2014/main" id="{F927E3CD-0C2E-2B4A-B79F-6CE4DD69EB8C}"/>
+                <a16:creationId xmlns:a16="http://schemas.microsoft.com/office/drawing/2014/main" id="{A40F5990-07D7-614F-B3C6-954900348894}"/>
               </a:ext>
             </a:extLst>
           </p:cNvPr>
-          <p:cNvSpPr>
-            <a:spLocks noGrp="1"/>
-          </p:cNvSpPr>
+          <p:cNvPicPr>
+            <a:picLocks noGrp="1" noChangeAspect="1"/>
+          </p:cNvPicPr>
           <p:nvPr>
-            <p:ph type="title"/>
+            <p:ph idx="1"/>
           </p:nvPr>
+        </p:nvPicPr>
+        <p:blipFill>
+          <a:blip r:embed="rId2">
+            <a:extLst>
+              <a:ext uri="{28A0092B-C50C-407E-A947-70E740481C1C}">
+                <a14:useLocalDpi xmlns:a14="http://schemas.microsoft.com/office/drawing/2010/main" val="0"/>
+              </a:ext>
+            </a:extLst>
+          </a:blip>
+          <a:srcRect/>
+          <a:stretch/>
+        </p:blipFill>
+        <p:spPr>
+          <a:xfrm>
+            <a:off x="235865" y="295835"/>
+            <a:ext cx="11236176" cy="6266328"/>
+          </a:xfrm>
+        </p:spPr>
+      </p:pic>
+      <p:sp>
+        <p:nvSpPr>
+          <p:cNvPr id="3" name="TextBox 2">
+            <a:extLst>
+              <a:ext uri="{FF2B5EF4-FFF2-40B4-BE49-F238E27FC236}">
+                <a16:creationId xmlns:a16="http://schemas.microsoft.com/office/drawing/2014/main" id="{1B04373D-5534-8140-856E-837D5C704AEF}"/>
+              </a:ext>
+            </a:extLst>
+          </p:cNvPr>
+          <p:cNvSpPr txBox="1"/>
+          <p:nvPr/>
         </p:nvSpPr>
-        <p:spPr/>
+        <p:spPr>
+          <a:xfrm>
+            <a:off x="192062" y="103363"/>
+            <a:ext cx="4791505" cy="338554"/>
+          </a:xfrm>
+          <a:prstGeom prst="rect">
+            <a:avLst/>
+          </a:prstGeom>
+          <a:noFill/>
+        </p:spPr>
         <p:txBody>
-          <a:bodyPr/>
+          <a:bodyPr wrap="none" rtlCol="0">
+            <a:spAutoFit/>
+          </a:bodyPr>
           <a:lstStyle/>
           <a:p>
             <a:r>
-              <a:rPr lang="en-US" dirty="0"/>
-              <a:t>Care homes</a:t>
+              <a:rPr lang="en-US" sz="1600" dirty="0"/>
+              <a:t>Covid-19 mortality; occurring 01/03/2020 – 17/04/2020</a:t>
             </a:r>
-          </a:p>
-        </p:txBody>
-      </p:sp>
-      <p:sp>
-        <p:nvSpPr>
-          <p:cNvPr id="3" name="Content Placeholder 2">
-            <a:extLst>
-              <a:ext uri="{FF2B5EF4-FFF2-40B4-BE49-F238E27FC236}">
-                <a16:creationId xmlns:a16="http://schemas.microsoft.com/office/drawing/2014/main" id="{3D1C0A0D-DBB2-3948-8796-01DA98B5DFFE}"/>
-              </a:ext>
-            </a:extLst>
-          </p:cNvPr>
-          <p:cNvSpPr>
-            <a:spLocks noGrp="1"/>
-          </p:cNvSpPr>
-          <p:nvPr>
-            <p:ph idx="1"/>
-          </p:nvPr>
-        </p:nvSpPr>
-        <p:spPr/>
-        <p:txBody>
-          <a:bodyPr/>
-          <a:lstStyle/>
-          <a:p>
-            <a:endParaRPr lang="en-US"/>
           </a:p>
         </p:txBody>
       </p:sp>
     </p:spTree>
     <p:extLst>
       <p:ext uri="{BB962C8B-B14F-4D97-AF65-F5344CB8AC3E}">
-        <p14:creationId xmlns:p14="http://schemas.microsoft.com/office/powerpoint/2010/main" val="4200131781"/>
+        <p14:creationId xmlns:p14="http://schemas.microsoft.com/office/powerpoint/2010/main" val="1783523825"/>
+      </p:ext>
+    </p:extLst>
+  </p:cSld>
+  <p:clrMapOvr>
+    <a:masterClrMapping/>
+  </p:clrMapOvr>
+</p:sld>
+</file>
+
+<file path=ppt/slides/slide9.xml><?xml version="1.0" encoding="utf-8"?>
+<p:sld xmlns:a="http://schemas.openxmlformats.org/drawingml/2006/main" xmlns:r="http://schemas.openxmlformats.org/officeDocument/2006/relationships" xmlns:p="http://schemas.openxmlformats.org/presentationml/2006/main">
+  <p:cSld>
+    <p:spTree>
+      <p:nvGrpSpPr>
+        <p:cNvPr id="1" name=""/>
+        <p:cNvGrpSpPr/>
+        <p:nvPr/>
+      </p:nvGrpSpPr>
+      <p:grpSpPr>
+        <a:xfrm>
+          <a:off x="0" y="0"/>
+          <a:ext cx="0" cy="0"/>
+          <a:chOff x="0" y="0"/>
+          <a:chExt cx="0" cy="0"/>
+        </a:xfrm>
+      </p:grpSpPr>
+      <p:pic>
+        <p:nvPicPr>
+          <p:cNvPr id="5" name="Content Placeholder 4">
+            <a:extLst>
+              <a:ext uri="{FF2B5EF4-FFF2-40B4-BE49-F238E27FC236}">
+                <a16:creationId xmlns:a16="http://schemas.microsoft.com/office/drawing/2014/main" id="{A40F5990-07D7-614F-B3C6-954900348894}"/>
+              </a:ext>
+            </a:extLst>
+          </p:cNvPr>
+          <p:cNvPicPr>
+            <a:picLocks noGrp="1" noChangeAspect="1"/>
+          </p:cNvPicPr>
+          <p:nvPr>
+            <p:ph idx="1"/>
+          </p:nvPr>
+        </p:nvPicPr>
+        <p:blipFill>
+          <a:blip r:embed="rId2">
+            <a:extLst>
+              <a:ext uri="{28A0092B-C50C-407E-A947-70E740481C1C}">
+                <a14:useLocalDpi xmlns:a14="http://schemas.microsoft.com/office/drawing/2010/main" val="0"/>
+              </a:ext>
+            </a:extLst>
+          </a:blip>
+          <a:srcRect/>
+          <a:stretch/>
+        </p:blipFill>
+        <p:spPr>
+          <a:xfrm>
+            <a:off x="235866" y="295835"/>
+            <a:ext cx="11236174" cy="6266328"/>
+          </a:xfrm>
+        </p:spPr>
+      </p:pic>
+      <p:sp>
+        <p:nvSpPr>
+          <p:cNvPr id="3" name="TextBox 2">
+            <a:extLst>
+              <a:ext uri="{FF2B5EF4-FFF2-40B4-BE49-F238E27FC236}">
+                <a16:creationId xmlns:a16="http://schemas.microsoft.com/office/drawing/2014/main" id="{1B04373D-5534-8140-856E-837D5C704AEF}"/>
+              </a:ext>
+            </a:extLst>
+          </p:cNvPr>
+          <p:cNvSpPr txBox="1"/>
+          <p:nvPr/>
+        </p:nvSpPr>
+        <p:spPr>
+          <a:xfrm>
+            <a:off x="192062" y="103363"/>
+            <a:ext cx="4791505" cy="338554"/>
+          </a:xfrm>
+          <a:prstGeom prst="rect">
+            <a:avLst/>
+          </a:prstGeom>
+          <a:noFill/>
+        </p:spPr>
+        <p:txBody>
+          <a:bodyPr wrap="none" rtlCol="0">
+            <a:spAutoFit/>
+          </a:bodyPr>
+          <a:lstStyle/>
+          <a:p>
+            <a:r>
+              <a:rPr lang="en-US" sz="1600" dirty="0"/>
+              <a:t>Covid-19 mortality; occurring 01/03/2020 – 17/04/2020</a:t>
+            </a:r>
+          </a:p>
+        </p:txBody>
+      </p:sp>
+    </p:spTree>
+    <p:extLst>
+      <p:ext uri="{BB962C8B-B14F-4D97-AF65-F5344CB8AC3E}">
+        <p14:creationId xmlns:p14="http://schemas.microsoft.com/office/powerpoint/2010/main" val="3752983048"/>
       </p:ext>
     </p:extLst>
   </p:cSld>

</xml_diff>